<commit_message>
replotting pilot behavior data
</commit_message>
<xml_diff>
--- a/mild_master_neuroimaging_pilot.pptx
+++ b/mild_master_neuroimaging_pilot.pptx
@@ -8,7 +8,14 @@
     <p:sldId id="256" r:id="rId2"/>
     <p:sldId id="257" r:id="rId3"/>
     <p:sldId id="258" r:id="rId4"/>
-    <p:sldId id="259" r:id="rId5"/>
+    <p:sldId id="262" r:id="rId5"/>
+    <p:sldId id="259" r:id="rId6"/>
+    <p:sldId id="260" r:id="rId7"/>
+    <p:sldId id="261" r:id="rId8"/>
+    <p:sldId id="263" r:id="rId9"/>
+    <p:sldId id="264" r:id="rId10"/>
+    <p:sldId id="265" r:id="rId11"/>
+    <p:sldId id="266" r:id="rId12"/>
   </p:sldIdLst>
   <p:sldSz cx="12192000" cy="6858000"/>
   <p:notesSz cx="6858000" cy="9144000"/>
@@ -107,6 +114,11 @@
       </a:defRPr>
     </a:lvl9pPr>
   </p:defaultTextStyle>
+  <p:extLst>
+    <p:ext uri="{EFAFB233-063F-42B5-8137-9DF3F51BA10A}">
+      <p15:sldGuideLst xmlns:p15="http://schemas.microsoft.com/office/powerpoint/2012/main"/>
+    </p:ext>
+  </p:extLst>
 </p:presentation>
 </file>
 
@@ -257,7 +269,7 @@
           <a:p>
             <a:fld id="{C6CACAED-D859-483C-9AE0-4A15DC8C2EE7}" type="datetimeFigureOut">
               <a:rPr lang="en-US" smtClean="0"/>
-              <a:t>10/8/2024</a:t>
+              <a:t>10/9/2024</a:t>
             </a:fld>
             <a:endParaRPr lang="en-US"/>
           </a:p>
@@ -455,7 +467,7 @@
           <a:p>
             <a:fld id="{C6CACAED-D859-483C-9AE0-4A15DC8C2EE7}" type="datetimeFigureOut">
               <a:rPr lang="en-US" smtClean="0"/>
-              <a:t>10/8/2024</a:t>
+              <a:t>10/9/2024</a:t>
             </a:fld>
             <a:endParaRPr lang="en-US"/>
           </a:p>
@@ -663,7 +675,7 @@
           <a:p>
             <a:fld id="{C6CACAED-D859-483C-9AE0-4A15DC8C2EE7}" type="datetimeFigureOut">
               <a:rPr lang="en-US" smtClean="0"/>
-              <a:t>10/8/2024</a:t>
+              <a:t>10/9/2024</a:t>
             </a:fld>
             <a:endParaRPr lang="en-US"/>
           </a:p>
@@ -861,7 +873,7 @@
           <a:p>
             <a:fld id="{C6CACAED-D859-483C-9AE0-4A15DC8C2EE7}" type="datetimeFigureOut">
               <a:rPr lang="en-US" smtClean="0"/>
-              <a:t>10/8/2024</a:t>
+              <a:t>10/9/2024</a:t>
             </a:fld>
             <a:endParaRPr lang="en-US"/>
           </a:p>
@@ -1136,7 +1148,7 @@
           <a:p>
             <a:fld id="{C6CACAED-D859-483C-9AE0-4A15DC8C2EE7}" type="datetimeFigureOut">
               <a:rPr lang="en-US" smtClean="0"/>
-              <a:t>10/8/2024</a:t>
+              <a:t>10/9/2024</a:t>
             </a:fld>
             <a:endParaRPr lang="en-US"/>
           </a:p>
@@ -1401,7 +1413,7 @@
           <a:p>
             <a:fld id="{C6CACAED-D859-483C-9AE0-4A15DC8C2EE7}" type="datetimeFigureOut">
               <a:rPr lang="en-US" smtClean="0"/>
-              <a:t>10/8/2024</a:t>
+              <a:t>10/9/2024</a:t>
             </a:fld>
             <a:endParaRPr lang="en-US"/>
           </a:p>
@@ -1813,7 +1825,7 @@
           <a:p>
             <a:fld id="{C6CACAED-D859-483C-9AE0-4A15DC8C2EE7}" type="datetimeFigureOut">
               <a:rPr lang="en-US" smtClean="0"/>
-              <a:t>10/8/2024</a:t>
+              <a:t>10/9/2024</a:t>
             </a:fld>
             <a:endParaRPr lang="en-US"/>
           </a:p>
@@ -1954,7 +1966,7 @@
           <a:p>
             <a:fld id="{C6CACAED-D859-483C-9AE0-4A15DC8C2EE7}" type="datetimeFigureOut">
               <a:rPr lang="en-US" smtClean="0"/>
-              <a:t>10/8/2024</a:t>
+              <a:t>10/9/2024</a:t>
             </a:fld>
             <a:endParaRPr lang="en-US"/>
           </a:p>
@@ -2067,7 +2079,7 @@
           <a:p>
             <a:fld id="{C6CACAED-D859-483C-9AE0-4A15DC8C2EE7}" type="datetimeFigureOut">
               <a:rPr lang="en-US" smtClean="0"/>
-              <a:t>10/8/2024</a:t>
+              <a:t>10/9/2024</a:t>
             </a:fld>
             <a:endParaRPr lang="en-US"/>
           </a:p>
@@ -2378,7 +2390,7 @@
           <a:p>
             <a:fld id="{C6CACAED-D859-483C-9AE0-4A15DC8C2EE7}" type="datetimeFigureOut">
               <a:rPr lang="en-US" smtClean="0"/>
-              <a:t>10/8/2024</a:t>
+              <a:t>10/9/2024</a:t>
             </a:fld>
             <a:endParaRPr lang="en-US"/>
           </a:p>
@@ -2666,7 +2678,7 @@
           <a:p>
             <a:fld id="{C6CACAED-D859-483C-9AE0-4A15DC8C2EE7}" type="datetimeFigureOut">
               <a:rPr lang="en-US" smtClean="0"/>
-              <a:t>10/8/2024</a:t>
+              <a:t>10/9/2024</a:t>
             </a:fld>
             <a:endParaRPr lang="en-US"/>
           </a:p>
@@ -2907,7 +2919,7 @@
           <a:p>
             <a:fld id="{C6CACAED-D859-483C-9AE0-4A15DC8C2EE7}" type="datetimeFigureOut">
               <a:rPr lang="en-US" smtClean="0"/>
-              <a:t>10/8/2024</a:t>
+              <a:t>10/9/2024</a:t>
             </a:fld>
             <a:endParaRPr lang="en-US"/>
           </a:p>
@@ -3390,6 +3402,176 @@
 </p:sld>
 </file>
 
+<file path=ppt/slides/slide10.xml><?xml version="1.0" encoding="utf-8"?>
+<p:sld xmlns:a="http://schemas.openxmlformats.org/drawingml/2006/main" xmlns:r="http://schemas.openxmlformats.org/officeDocument/2006/relationships" xmlns:p="http://schemas.openxmlformats.org/presentationml/2006/main">
+  <p:cSld>
+    <p:spTree>
+      <p:nvGrpSpPr>
+        <p:cNvPr id="1" name=""/>
+        <p:cNvGrpSpPr/>
+        <p:nvPr/>
+      </p:nvGrpSpPr>
+      <p:grpSpPr>
+        <a:xfrm>
+          <a:off x="0" y="0"/>
+          <a:ext cx="0" cy="0"/>
+          <a:chOff x="0" y="0"/>
+          <a:chExt cx="0" cy="0"/>
+        </a:xfrm>
+      </p:grpSpPr>
+      <p:sp>
+        <p:nvSpPr>
+          <p:cNvPr id="2" name="Title 1">
+            <a:extLst>
+              <a:ext uri="{FF2B5EF4-FFF2-40B4-BE49-F238E27FC236}">
+                <a16:creationId xmlns:a16="http://schemas.microsoft.com/office/drawing/2014/main" id="{92D6B347-E763-522C-AA0B-C90B39544C29}"/>
+              </a:ext>
+            </a:extLst>
+          </p:cNvPr>
+          <p:cNvSpPr>
+            <a:spLocks noGrp="1"/>
+          </p:cNvSpPr>
+          <p:nvPr>
+            <p:ph type="title"/>
+          </p:nvPr>
+        </p:nvSpPr>
+        <p:spPr/>
+        <p:txBody>
+          <a:bodyPr/>
+          <a:lstStyle/>
+          <a:p>
+            <a:r>
+              <a:rPr lang="en-US" dirty="0"/>
+              <a:t>Button Press at Fz</a:t>
+            </a:r>
+          </a:p>
+        </p:txBody>
+      </p:sp>
+      <p:sp>
+        <p:nvSpPr>
+          <p:cNvPr id="3" name="Content Placeholder 2">
+            <a:extLst>
+              <a:ext uri="{FF2B5EF4-FFF2-40B4-BE49-F238E27FC236}">
+                <a16:creationId xmlns:a16="http://schemas.microsoft.com/office/drawing/2014/main" id="{3DE9DE59-7C49-0907-F7FA-AC2E3C018D9F}"/>
+              </a:ext>
+            </a:extLst>
+          </p:cNvPr>
+          <p:cNvSpPr>
+            <a:spLocks noGrp="1"/>
+          </p:cNvSpPr>
+          <p:nvPr>
+            <p:ph idx="1"/>
+          </p:nvPr>
+        </p:nvSpPr>
+        <p:spPr/>
+        <p:txBody>
+          <a:bodyPr/>
+          <a:lstStyle/>
+          <a:p>
+            <a:endParaRPr lang="en-US"/>
+          </a:p>
+        </p:txBody>
+      </p:sp>
+    </p:spTree>
+    <p:extLst>
+      <p:ext uri="{BB962C8B-B14F-4D97-AF65-F5344CB8AC3E}">
+        <p14:creationId xmlns:p14="http://schemas.microsoft.com/office/powerpoint/2010/main" val="676225538"/>
+      </p:ext>
+    </p:extLst>
+  </p:cSld>
+  <p:clrMapOvr>
+    <a:masterClrMapping/>
+  </p:clrMapOvr>
+</p:sld>
+</file>
+
+<file path=ppt/slides/slide11.xml><?xml version="1.0" encoding="utf-8"?>
+<p:sld xmlns:a="http://schemas.openxmlformats.org/drawingml/2006/main" xmlns:r="http://schemas.openxmlformats.org/officeDocument/2006/relationships" xmlns:p="http://schemas.openxmlformats.org/presentationml/2006/main">
+  <p:cSld>
+    <p:spTree>
+      <p:nvGrpSpPr>
+        <p:cNvPr id="1" name=""/>
+        <p:cNvGrpSpPr/>
+        <p:nvPr/>
+      </p:nvGrpSpPr>
+      <p:grpSpPr>
+        <a:xfrm>
+          <a:off x="0" y="0"/>
+          <a:ext cx="0" cy="0"/>
+          <a:chOff x="0" y="0"/>
+          <a:chExt cx="0" cy="0"/>
+        </a:xfrm>
+      </p:grpSpPr>
+      <p:sp>
+        <p:nvSpPr>
+          <p:cNvPr id="2" name="Title 1">
+            <a:extLst>
+              <a:ext uri="{FF2B5EF4-FFF2-40B4-BE49-F238E27FC236}">
+                <a16:creationId xmlns:a16="http://schemas.microsoft.com/office/drawing/2014/main" id="{90E11623-04AF-CB7B-1957-37E0AB503E50}"/>
+              </a:ext>
+            </a:extLst>
+          </p:cNvPr>
+          <p:cNvSpPr>
+            <a:spLocks noGrp="1"/>
+          </p:cNvSpPr>
+          <p:nvPr>
+            <p:ph type="title"/>
+          </p:nvPr>
+        </p:nvSpPr>
+        <p:spPr/>
+        <p:txBody>
+          <a:bodyPr/>
+          <a:lstStyle/>
+          <a:p>
+            <a:r>
+              <a:rPr lang="en-US" dirty="0"/>
+              <a:t>Button Press at </a:t>
+            </a:r>
+            <a:r>
+              <a:rPr lang="en-US"/>
+              <a:t>Pz</a:t>
+            </a:r>
+          </a:p>
+        </p:txBody>
+      </p:sp>
+      <p:sp>
+        <p:nvSpPr>
+          <p:cNvPr id="3" name="Content Placeholder 2">
+            <a:extLst>
+              <a:ext uri="{FF2B5EF4-FFF2-40B4-BE49-F238E27FC236}">
+                <a16:creationId xmlns:a16="http://schemas.microsoft.com/office/drawing/2014/main" id="{604A3052-AE72-4179-F744-E5112BF4CDEA}"/>
+              </a:ext>
+            </a:extLst>
+          </p:cNvPr>
+          <p:cNvSpPr>
+            <a:spLocks noGrp="1"/>
+          </p:cNvSpPr>
+          <p:nvPr>
+            <p:ph idx="1"/>
+          </p:nvPr>
+        </p:nvSpPr>
+        <p:spPr/>
+        <p:txBody>
+          <a:bodyPr/>
+          <a:lstStyle/>
+          <a:p>
+            <a:endParaRPr lang="en-US"/>
+          </a:p>
+        </p:txBody>
+      </p:sp>
+    </p:spTree>
+    <p:extLst>
+      <p:ext uri="{BB962C8B-B14F-4D97-AF65-F5344CB8AC3E}">
+        <p14:creationId xmlns:p14="http://schemas.microsoft.com/office/powerpoint/2010/main" val="214353769"/>
+      </p:ext>
+    </p:extLst>
+  </p:cSld>
+  <p:clrMapOvr>
+    <a:masterClrMapping/>
+  </p:clrMapOvr>
+</p:sld>
+</file>
+
 <file path=ppt/slides/slide2.xml><?xml version="1.0" encoding="utf-8"?>
 <p:sld xmlns:a="http://schemas.openxmlformats.org/drawingml/2006/main" xmlns:r="http://schemas.openxmlformats.org/officeDocument/2006/relationships" xmlns:p="http://schemas.openxmlformats.org/presentationml/2006/main">
   <p:cSld>
@@ -3643,6 +3825,99 @@
           <p:cNvPr id="2" name="Title 1">
             <a:extLst>
               <a:ext uri="{FF2B5EF4-FFF2-40B4-BE49-F238E27FC236}">
+                <a16:creationId xmlns:a16="http://schemas.microsoft.com/office/drawing/2014/main" id="{55741FC5-10CB-5744-6FE0-C1F3651D1401}"/>
+              </a:ext>
+            </a:extLst>
+          </p:cNvPr>
+          <p:cNvSpPr>
+            <a:spLocks noGrp="1"/>
+          </p:cNvSpPr>
+          <p:nvPr>
+            <p:ph type="title"/>
+          </p:nvPr>
+        </p:nvSpPr>
+        <p:spPr>
+          <a:xfrm>
+            <a:off x="838200" y="-102235"/>
+            <a:ext cx="10515600" cy="1325563"/>
+          </a:xfrm>
+        </p:spPr>
+        <p:txBody>
+          <a:bodyPr/>
+          <a:lstStyle/>
+          <a:p>
+            <a:r>
+              <a:rPr lang="en-US" dirty="0"/>
+              <a:t>ERP topographies</a:t>
+            </a:r>
+          </a:p>
+        </p:txBody>
+      </p:sp>
+      <p:pic>
+        <p:nvPicPr>
+          <p:cNvPr id="5" name="Picture 4">
+            <a:extLst>
+              <a:ext uri="{FF2B5EF4-FFF2-40B4-BE49-F238E27FC236}">
+                <a16:creationId xmlns:a16="http://schemas.microsoft.com/office/drawing/2014/main" id="{12983BDC-D30A-F1C8-C6A1-B03B545CC8CB}"/>
+              </a:ext>
+            </a:extLst>
+          </p:cNvPr>
+          <p:cNvPicPr>
+            <a:picLocks noChangeAspect="1"/>
+          </p:cNvPicPr>
+          <p:nvPr/>
+        </p:nvPicPr>
+        <p:blipFill>
+          <a:blip r:embed="rId2"/>
+          <a:stretch>
+            <a:fillRect/>
+          </a:stretch>
+        </p:blipFill>
+        <p:spPr>
+          <a:xfrm>
+            <a:off x="0" y="763746"/>
+            <a:ext cx="12192000" cy="5880100"/>
+          </a:xfrm>
+          <a:prstGeom prst="rect">
+            <a:avLst/>
+          </a:prstGeom>
+        </p:spPr>
+      </p:pic>
+    </p:spTree>
+    <p:extLst>
+      <p:ext uri="{BB962C8B-B14F-4D97-AF65-F5344CB8AC3E}">
+        <p14:creationId xmlns:p14="http://schemas.microsoft.com/office/powerpoint/2010/main" val="58717464"/>
+      </p:ext>
+    </p:extLst>
+  </p:cSld>
+  <p:clrMapOvr>
+    <a:masterClrMapping/>
+  </p:clrMapOvr>
+</p:sld>
+</file>
+
+<file path=ppt/slides/slide5.xml><?xml version="1.0" encoding="utf-8"?>
+<p:sld xmlns:a="http://schemas.openxmlformats.org/drawingml/2006/main" xmlns:r="http://schemas.openxmlformats.org/officeDocument/2006/relationships" xmlns:p="http://schemas.openxmlformats.org/presentationml/2006/main">
+  <p:cSld>
+    <p:spTree>
+      <p:nvGrpSpPr>
+        <p:cNvPr id="1" name=""/>
+        <p:cNvGrpSpPr/>
+        <p:nvPr/>
+      </p:nvGrpSpPr>
+      <p:grpSpPr>
+        <a:xfrm>
+          <a:off x="0" y="0"/>
+          <a:ext cx="0" cy="0"/>
+          <a:chOff x="0" y="0"/>
+          <a:chExt cx="0" cy="0"/>
+        </a:xfrm>
+      </p:grpSpPr>
+      <p:sp>
+        <p:nvSpPr>
+          <p:cNvPr id="2" name="Title 1">
+            <a:extLst>
+              <a:ext uri="{FF2B5EF4-FFF2-40B4-BE49-F238E27FC236}">
                 <a16:creationId xmlns:a16="http://schemas.microsoft.com/office/drawing/2014/main" id="{E002DAF3-3BFE-0A02-0F70-4E0265188B39}"/>
               </a:ext>
             </a:extLst>
@@ -3654,47 +3929,431 @@
             <p:ph type="title"/>
           </p:nvPr>
         </p:nvSpPr>
-        <p:spPr/>
-        <p:txBody>
-          <a:bodyPr/>
-          <a:lstStyle/>
-          <a:p>
-            <a:r>
-              <a:rPr lang="en-US"/>
-              <a:t>ERPs</a:t>
-            </a:r>
-          </a:p>
-        </p:txBody>
-      </p:sp>
-      <p:sp>
-        <p:nvSpPr>
-          <p:cNvPr id="3" name="Content Placeholder 2">
-            <a:extLst>
-              <a:ext uri="{FF2B5EF4-FFF2-40B4-BE49-F238E27FC236}">
-                <a16:creationId xmlns:a16="http://schemas.microsoft.com/office/drawing/2014/main" id="{EE038E36-3020-27BE-FF31-A771A47E905A}"/>
-              </a:ext>
-            </a:extLst>
-          </p:cNvPr>
-          <p:cNvSpPr>
-            <a:spLocks noGrp="1"/>
-          </p:cNvSpPr>
-          <p:nvPr>
-            <p:ph idx="1"/>
-          </p:nvPr>
-        </p:nvSpPr>
-        <p:spPr/>
-        <p:txBody>
-          <a:bodyPr/>
-          <a:lstStyle/>
-          <a:p>
-            <a:endParaRPr lang="en-US"/>
-          </a:p>
-        </p:txBody>
-      </p:sp>
+        <p:spPr>
+          <a:xfrm>
+            <a:off x="838200" y="-168116"/>
+            <a:ext cx="10515600" cy="1325563"/>
+          </a:xfrm>
+        </p:spPr>
+        <p:txBody>
+          <a:bodyPr/>
+          <a:lstStyle/>
+          <a:p>
+            <a:r>
+              <a:rPr lang="en-US" dirty="0"/>
+              <a:t>ERPs at </a:t>
+            </a:r>
+            <a:r>
+              <a:rPr lang="en-US" dirty="0" err="1"/>
+              <a:t>Cz</a:t>
+            </a:r>
+            <a:endParaRPr lang="en-US" dirty="0"/>
+          </a:p>
+        </p:txBody>
+      </p:sp>
+      <p:pic>
+        <p:nvPicPr>
+          <p:cNvPr id="9" name="Picture 8">
+            <a:extLst>
+              <a:ext uri="{FF2B5EF4-FFF2-40B4-BE49-F238E27FC236}">
+                <a16:creationId xmlns:a16="http://schemas.microsoft.com/office/drawing/2014/main" id="{2625C651-9606-6E40-EBDE-71EF67052787}"/>
+              </a:ext>
+            </a:extLst>
+          </p:cNvPr>
+          <p:cNvPicPr>
+            <a:picLocks noChangeAspect="1"/>
+          </p:cNvPicPr>
+          <p:nvPr/>
+        </p:nvPicPr>
+        <p:blipFill>
+          <a:blip r:embed="rId2"/>
+          <a:stretch>
+            <a:fillRect/>
+          </a:stretch>
+        </p:blipFill>
+        <p:spPr>
+          <a:xfrm>
+            <a:off x="0" y="679927"/>
+            <a:ext cx="12192000" cy="5965505"/>
+          </a:xfrm>
+          <a:prstGeom prst="rect">
+            <a:avLst/>
+          </a:prstGeom>
+        </p:spPr>
+      </p:pic>
     </p:spTree>
     <p:extLst>
       <p:ext uri="{BB962C8B-B14F-4D97-AF65-F5344CB8AC3E}">
         <p14:creationId xmlns:p14="http://schemas.microsoft.com/office/powerpoint/2010/main" val="77255183"/>
+      </p:ext>
+    </p:extLst>
+  </p:cSld>
+  <p:clrMapOvr>
+    <a:masterClrMapping/>
+  </p:clrMapOvr>
+</p:sld>
+</file>
+
+<file path=ppt/slides/slide6.xml><?xml version="1.0" encoding="utf-8"?>
+<p:sld xmlns:a="http://schemas.openxmlformats.org/drawingml/2006/main" xmlns:r="http://schemas.openxmlformats.org/officeDocument/2006/relationships" xmlns:p="http://schemas.openxmlformats.org/presentationml/2006/main">
+  <p:cSld>
+    <p:spTree>
+      <p:nvGrpSpPr>
+        <p:cNvPr id="1" name=""/>
+        <p:cNvGrpSpPr/>
+        <p:nvPr/>
+      </p:nvGrpSpPr>
+      <p:grpSpPr>
+        <a:xfrm>
+          <a:off x="0" y="0"/>
+          <a:ext cx="0" cy="0"/>
+          <a:chOff x="0" y="0"/>
+          <a:chExt cx="0" cy="0"/>
+        </a:xfrm>
+      </p:grpSpPr>
+      <p:sp>
+        <p:nvSpPr>
+          <p:cNvPr id="2" name="Title 1">
+            <a:extLst>
+              <a:ext uri="{FF2B5EF4-FFF2-40B4-BE49-F238E27FC236}">
+                <a16:creationId xmlns:a16="http://schemas.microsoft.com/office/drawing/2014/main" id="{340B64D0-62BB-A57E-BABD-15E1B86D7608}"/>
+              </a:ext>
+            </a:extLst>
+          </p:cNvPr>
+          <p:cNvSpPr>
+            <a:spLocks noGrp="1"/>
+          </p:cNvSpPr>
+          <p:nvPr>
+            <p:ph type="title"/>
+          </p:nvPr>
+        </p:nvSpPr>
+        <p:spPr>
+          <a:xfrm>
+            <a:off x="838200" y="0"/>
+            <a:ext cx="10515600" cy="1325563"/>
+          </a:xfrm>
+        </p:spPr>
+        <p:txBody>
+          <a:bodyPr/>
+          <a:lstStyle/>
+          <a:p>
+            <a:r>
+              <a:rPr lang="en-US" dirty="0"/>
+              <a:t>ERPs at Fz</a:t>
+            </a:r>
+          </a:p>
+        </p:txBody>
+      </p:sp>
+      <p:pic>
+        <p:nvPicPr>
+          <p:cNvPr id="5" name="Picture 4">
+            <a:extLst>
+              <a:ext uri="{FF2B5EF4-FFF2-40B4-BE49-F238E27FC236}">
+                <a16:creationId xmlns:a16="http://schemas.microsoft.com/office/drawing/2014/main" id="{AC106F39-5C5A-DA99-E592-97895E1AD153}"/>
+              </a:ext>
+            </a:extLst>
+          </p:cNvPr>
+          <p:cNvPicPr>
+            <a:picLocks noChangeAspect="1"/>
+          </p:cNvPicPr>
+          <p:nvPr/>
+        </p:nvPicPr>
+        <p:blipFill>
+          <a:blip r:embed="rId2"/>
+          <a:stretch>
+            <a:fillRect/>
+          </a:stretch>
+        </p:blipFill>
+        <p:spPr>
+          <a:xfrm>
+            <a:off x="0" y="864689"/>
+            <a:ext cx="12192000" cy="5993311"/>
+          </a:xfrm>
+          <a:prstGeom prst="rect">
+            <a:avLst/>
+          </a:prstGeom>
+        </p:spPr>
+      </p:pic>
+    </p:spTree>
+    <p:extLst>
+      <p:ext uri="{BB962C8B-B14F-4D97-AF65-F5344CB8AC3E}">
+        <p14:creationId xmlns:p14="http://schemas.microsoft.com/office/powerpoint/2010/main" val="543311727"/>
+      </p:ext>
+    </p:extLst>
+  </p:cSld>
+  <p:clrMapOvr>
+    <a:masterClrMapping/>
+  </p:clrMapOvr>
+</p:sld>
+</file>
+
+<file path=ppt/slides/slide7.xml><?xml version="1.0" encoding="utf-8"?>
+<p:sld xmlns:a="http://schemas.openxmlformats.org/drawingml/2006/main" xmlns:r="http://schemas.openxmlformats.org/officeDocument/2006/relationships" xmlns:p="http://schemas.openxmlformats.org/presentationml/2006/main">
+  <p:cSld>
+    <p:spTree>
+      <p:nvGrpSpPr>
+        <p:cNvPr id="1" name=""/>
+        <p:cNvGrpSpPr/>
+        <p:nvPr/>
+      </p:nvGrpSpPr>
+      <p:grpSpPr>
+        <a:xfrm>
+          <a:off x="0" y="0"/>
+          <a:ext cx="0" cy="0"/>
+          <a:chOff x="0" y="0"/>
+          <a:chExt cx="0" cy="0"/>
+        </a:xfrm>
+      </p:grpSpPr>
+      <p:sp>
+        <p:nvSpPr>
+          <p:cNvPr id="2" name="Title 1">
+            <a:extLst>
+              <a:ext uri="{FF2B5EF4-FFF2-40B4-BE49-F238E27FC236}">
+                <a16:creationId xmlns:a16="http://schemas.microsoft.com/office/drawing/2014/main" id="{2DB172FE-1BD3-A673-1460-27D7FE03CA19}"/>
+              </a:ext>
+            </a:extLst>
+          </p:cNvPr>
+          <p:cNvSpPr>
+            <a:spLocks noGrp="1"/>
+          </p:cNvSpPr>
+          <p:nvPr>
+            <p:ph type="title"/>
+          </p:nvPr>
+        </p:nvSpPr>
+        <p:spPr>
+          <a:xfrm>
+            <a:off x="838200" y="131762"/>
+            <a:ext cx="10515600" cy="549275"/>
+          </a:xfrm>
+        </p:spPr>
+        <p:txBody>
+          <a:bodyPr>
+            <a:normAutofit fontScale="90000"/>
+          </a:bodyPr>
+          <a:lstStyle/>
+          <a:p>
+            <a:r>
+              <a:rPr lang="en-US" dirty="0"/>
+              <a:t>ERPs at </a:t>
+            </a:r>
+            <a:r>
+              <a:rPr lang="en-US" dirty="0" err="1"/>
+              <a:t>Pz</a:t>
+            </a:r>
+            <a:endParaRPr lang="en-US" dirty="0"/>
+          </a:p>
+        </p:txBody>
+      </p:sp>
+      <p:pic>
+        <p:nvPicPr>
+          <p:cNvPr id="5" name="Picture 4">
+            <a:extLst>
+              <a:ext uri="{FF2B5EF4-FFF2-40B4-BE49-F238E27FC236}">
+                <a16:creationId xmlns:a16="http://schemas.microsoft.com/office/drawing/2014/main" id="{6B4B143E-3BB1-E36B-B4C5-D47526E93C2C}"/>
+              </a:ext>
+            </a:extLst>
+          </p:cNvPr>
+          <p:cNvPicPr>
+            <a:picLocks noChangeAspect="1"/>
+          </p:cNvPicPr>
+          <p:nvPr/>
+        </p:nvPicPr>
+        <p:blipFill>
+          <a:blip r:embed="rId2"/>
+          <a:stretch>
+            <a:fillRect/>
+          </a:stretch>
+        </p:blipFill>
+        <p:spPr>
+          <a:xfrm>
+            <a:off x="0" y="681037"/>
+            <a:ext cx="12192000" cy="5928986"/>
+          </a:xfrm>
+          <a:prstGeom prst="rect">
+            <a:avLst/>
+          </a:prstGeom>
+        </p:spPr>
+      </p:pic>
+    </p:spTree>
+    <p:extLst>
+      <p:ext uri="{BB962C8B-B14F-4D97-AF65-F5344CB8AC3E}">
+        <p14:creationId xmlns:p14="http://schemas.microsoft.com/office/powerpoint/2010/main" val="1984400871"/>
+      </p:ext>
+    </p:extLst>
+  </p:cSld>
+  <p:clrMapOvr>
+    <a:masterClrMapping/>
+  </p:clrMapOvr>
+</p:sld>
+</file>
+
+<file path=ppt/slides/slide8.xml><?xml version="1.0" encoding="utf-8"?>
+<p:sld xmlns:a="http://schemas.openxmlformats.org/drawingml/2006/main" xmlns:r="http://schemas.openxmlformats.org/officeDocument/2006/relationships" xmlns:p="http://schemas.openxmlformats.org/presentationml/2006/main">
+  <p:cSld>
+    <p:spTree>
+      <p:nvGrpSpPr>
+        <p:cNvPr id="1" name=""/>
+        <p:cNvGrpSpPr/>
+        <p:nvPr/>
+      </p:nvGrpSpPr>
+      <p:grpSpPr>
+        <a:xfrm>
+          <a:off x="0" y="0"/>
+          <a:ext cx="0" cy="0"/>
+          <a:chOff x="0" y="0"/>
+          <a:chExt cx="0" cy="0"/>
+        </a:xfrm>
+      </p:grpSpPr>
+      <p:sp>
+        <p:nvSpPr>
+          <p:cNvPr id="2" name="Title 1">
+            <a:extLst>
+              <a:ext uri="{FF2B5EF4-FFF2-40B4-BE49-F238E27FC236}">
+                <a16:creationId xmlns:a16="http://schemas.microsoft.com/office/drawing/2014/main" id="{BD6EADF0-7BB1-AE90-BC76-965A07600CE6}"/>
+              </a:ext>
+            </a:extLst>
+          </p:cNvPr>
+          <p:cNvSpPr>
+            <a:spLocks noGrp="1"/>
+          </p:cNvSpPr>
+          <p:nvPr>
+            <p:ph type="title"/>
+          </p:nvPr>
+        </p:nvSpPr>
+        <p:spPr/>
+        <p:txBody>
+          <a:bodyPr/>
+          <a:lstStyle/>
+          <a:p>
+            <a:r>
+              <a:rPr lang="en-US" dirty="0"/>
+              <a:t>Button press topography</a:t>
+            </a:r>
+          </a:p>
+        </p:txBody>
+      </p:sp>
+      <p:pic>
+        <p:nvPicPr>
+          <p:cNvPr id="5" name="Picture 4">
+            <a:extLst>
+              <a:ext uri="{FF2B5EF4-FFF2-40B4-BE49-F238E27FC236}">
+                <a16:creationId xmlns:a16="http://schemas.microsoft.com/office/drawing/2014/main" id="{D1962397-F3F7-2FAC-0060-E34A1EFEBCA4}"/>
+              </a:ext>
+            </a:extLst>
+          </p:cNvPr>
+          <p:cNvPicPr>
+            <a:picLocks noChangeAspect="1"/>
+          </p:cNvPicPr>
+          <p:nvPr/>
+        </p:nvPicPr>
+        <p:blipFill>
+          <a:blip r:embed="rId2"/>
+          <a:stretch>
+            <a:fillRect/>
+          </a:stretch>
+        </p:blipFill>
+        <p:spPr>
+          <a:xfrm>
+            <a:off x="0" y="2065193"/>
+            <a:ext cx="12192000" cy="2727614"/>
+          </a:xfrm>
+          <a:prstGeom prst="rect">
+            <a:avLst/>
+          </a:prstGeom>
+        </p:spPr>
+      </p:pic>
+    </p:spTree>
+    <p:extLst>
+      <p:ext uri="{BB962C8B-B14F-4D97-AF65-F5344CB8AC3E}">
+        <p14:creationId xmlns:p14="http://schemas.microsoft.com/office/powerpoint/2010/main" val="393005044"/>
+      </p:ext>
+    </p:extLst>
+  </p:cSld>
+  <p:clrMapOvr>
+    <a:masterClrMapping/>
+  </p:clrMapOvr>
+</p:sld>
+</file>
+
+<file path=ppt/slides/slide9.xml><?xml version="1.0" encoding="utf-8"?>
+<p:sld xmlns:a="http://schemas.openxmlformats.org/drawingml/2006/main" xmlns:r="http://schemas.openxmlformats.org/officeDocument/2006/relationships" xmlns:p="http://schemas.openxmlformats.org/presentationml/2006/main">
+  <p:cSld>
+    <p:spTree>
+      <p:nvGrpSpPr>
+        <p:cNvPr id="1" name=""/>
+        <p:cNvGrpSpPr/>
+        <p:nvPr/>
+      </p:nvGrpSpPr>
+      <p:grpSpPr>
+        <a:xfrm>
+          <a:off x="0" y="0"/>
+          <a:ext cx="0" cy="0"/>
+          <a:chOff x="0" y="0"/>
+          <a:chExt cx="0" cy="0"/>
+        </a:xfrm>
+      </p:grpSpPr>
+      <p:sp>
+        <p:nvSpPr>
+          <p:cNvPr id="2" name="Title 1">
+            <a:extLst>
+              <a:ext uri="{FF2B5EF4-FFF2-40B4-BE49-F238E27FC236}">
+                <a16:creationId xmlns:a16="http://schemas.microsoft.com/office/drawing/2014/main" id="{89A2EE30-357E-55E8-BC29-3AB9BA680866}"/>
+              </a:ext>
+            </a:extLst>
+          </p:cNvPr>
+          <p:cNvSpPr>
+            <a:spLocks noGrp="1"/>
+          </p:cNvSpPr>
+          <p:nvPr>
+            <p:ph type="title"/>
+          </p:nvPr>
+        </p:nvSpPr>
+        <p:spPr/>
+        <p:txBody>
+          <a:bodyPr/>
+          <a:lstStyle/>
+          <a:p>
+            <a:r>
+              <a:rPr lang="en-US" dirty="0"/>
+              <a:t>Button press at </a:t>
+            </a:r>
+            <a:r>
+              <a:rPr lang="en-US" dirty="0" err="1"/>
+              <a:t>Cz</a:t>
+            </a:r>
+            <a:endParaRPr lang="en-US" dirty="0"/>
+          </a:p>
+        </p:txBody>
+      </p:sp>
+      <p:sp>
+        <p:nvSpPr>
+          <p:cNvPr id="3" name="Content Placeholder 2">
+            <a:extLst>
+              <a:ext uri="{FF2B5EF4-FFF2-40B4-BE49-F238E27FC236}">
+                <a16:creationId xmlns:a16="http://schemas.microsoft.com/office/drawing/2014/main" id="{9787297F-4C6E-8751-8179-691CE208B709}"/>
+              </a:ext>
+            </a:extLst>
+          </p:cNvPr>
+          <p:cNvSpPr>
+            <a:spLocks noGrp="1"/>
+          </p:cNvSpPr>
+          <p:nvPr>
+            <p:ph idx="1"/>
+          </p:nvPr>
+        </p:nvSpPr>
+        <p:spPr/>
+        <p:txBody>
+          <a:bodyPr/>
+          <a:lstStyle/>
+          <a:p>
+            <a:endParaRPr lang="en-US"/>
+          </a:p>
+        </p:txBody>
+      </p:sp>
+    </p:spTree>
+    <p:extLst>
+      <p:ext uri="{BB962C8B-B14F-4D97-AF65-F5344CB8AC3E}">
+        <p14:creationId xmlns:p14="http://schemas.microsoft.com/office/powerpoint/2010/main" val="3051680369"/>
       </p:ext>
     </p:extLst>
   </p:cSld>

</xml_diff>